<commit_message>
Fix for issue #33
Fix for issue #33
</commit_message>
<xml_diff>
--- a/Whiteboard design session/WDS trainer presentation - Lift and shift.pptx
+++ b/Whiteboard design session/WDS trainer presentation - Lift and shift.pptx
@@ -262,7 +262,7 @@
           <a:p>
             <a:fld id="{0B4ED74A-224F-4188-850E-AD5C4B751E0D}" type="datetimeFigureOut">
               <a:rPr lang="en-US" smtClean="0"/>
-              <a:t>12/19/2018</a:t>
+              <a:t>1/21/2019</a:t>
             </a:fld>
             <a:endParaRPr lang="en-US" dirty="0"/>
           </a:p>
@@ -439,7 +439,7 @@
           <a:p>
             <a:fld id="{52A13B17-C506-4D51-BB37-16B365906619}" type="datetimeFigureOut">
               <a:rPr lang="en-US" smtClean="0"/>
-              <a:t>12/19/2018</a:t>
+              <a:t>1/21/2019</a:t>
             </a:fld>
             <a:endParaRPr lang="en-US" dirty="0"/>
           </a:p>
@@ -3921,7 +3921,21 @@
                 <a:ea typeface="+mn-ea"/>
                 <a:cs typeface="+mn-cs"/>
               </a:rPr>
-              <a:t>This poses a significant challenge. The existing physical servers use UEFI boot, and therefore Azure Site Recovery cannot be used. The application installers are not available, and so re-installing the application onto clean Azure VMs would be very difficult.</a:t>
+              <a:t>Azure Site Recovery could be used to migrate the web tier. The application installers are not available, and so re-installing the application</a:t>
+            </a:r>
+          </a:p>
+          <a:p>
+            <a:r>
+              <a:rPr lang="en-US" sz="1200" b="0" kern="1200" dirty="0">
+                <a:solidFill>
+                  <a:schemeClr val="tx1"/>
+                </a:solidFill>
+                <a:effectLst/>
+                <a:latin typeface="+mn-lt"/>
+                <a:ea typeface="+mn-ea"/>
+                <a:cs typeface="+mn-cs"/>
+              </a:rPr>
+              <a:t>onto clean Azure VMs would be very difficult. The steps to migrate would be similar to migrating the procurement application.</a:t>
             </a:r>
           </a:p>
           <a:p>
@@ -3946,7 +3960,7 @@
                 <a:ea typeface="+mn-ea"/>
                 <a:cs typeface="+mn-cs"/>
               </a:rPr>
-              <a:t>In this situation, use of third-party migration tools should be explored. For example, [CloudEndure](https://www.cloudendure.com/live-migration/)</a:t>
+              <a:t>Use ASR to facilitate the migration. ASR supports physical servers to ARM failovers and can be used for the web tier of the application. This allows for simple migration of the application without the need for the original application installers. </a:t>
             </a:r>
           </a:p>
           <a:p>
@@ -3960,14 +3974,10 @@
                 <a:ea typeface="+mn-ea"/>
                 <a:cs typeface="+mn-cs"/>
               </a:rPr>
-              <a:t>offers block-level migration of both VMs and physical servers. The migration process is as follows:</a:t>
-            </a:r>
-          </a:p>
-          <a:p>
-            <a:pPr marL="228600" indent="-228600">
-              <a:buFont typeface="+mj-lt"/>
-              <a:buAutoNum type="arabicPeriod"/>
-            </a:pPr>
+              <a:t>Use the [Azure documentation](https://docs.microsoft.com/en-us/azure/site-recovery/physical-azure-architecture) to set up ASR replication. This includes:</a:t>
+            </a:r>
+          </a:p>
+          <a:p>
             <a:r>
               <a:rPr lang="en-US" sz="1200" b="0" kern="1200" dirty="0">
                 <a:solidFill>
@@ -3978,14 +3988,10 @@
                 <a:ea typeface="+mn-ea"/>
                 <a:cs typeface="+mn-cs"/>
               </a:rPr>
-              <a:t>Install the CloudEndure agent on the physical servers to be migrated</a:t>
-            </a:r>
-          </a:p>
-          <a:p>
-            <a:pPr marL="228600" indent="-228600">
-              <a:buFont typeface="+mj-lt"/>
-              <a:buAutoNum type="arabicPeriod"/>
-            </a:pPr>
+              <a:t>- Provisioning the Azure environment (Recovery Services Vault, Virtual Network and Storage Account).</a:t>
+            </a:r>
+          </a:p>
+          <a:p>
             <a:r>
               <a:rPr lang="en-US" sz="1200" b="0" kern="1200" dirty="0">
                 <a:solidFill>
@@ -3996,14 +4002,10 @@
                 <a:ea typeface="+mn-ea"/>
                 <a:cs typeface="+mn-cs"/>
               </a:rPr>
-              <a:t>Specify the destination servers in Azure</a:t>
-            </a:r>
-          </a:p>
-          <a:p>
-            <a:pPr marL="228600" indent="-228600">
-              <a:buFont typeface="+mj-lt"/>
-              <a:buAutoNum type="arabicPeriod"/>
-            </a:pPr>
+              <a:t>- Setting up ASR in the on-premises environment, including deploying the ASR Configuration Server</a:t>
+            </a:r>
+          </a:p>
+          <a:p>
             <a:r>
               <a:rPr lang="en-US" sz="1200" b="0" kern="1200" dirty="0">
                 <a:solidFill>
@@ -4014,14 +4016,10 @@
                 <a:ea typeface="+mn-ea"/>
                 <a:cs typeface="+mn-cs"/>
               </a:rPr>
-              <a:t>CloudEndure will replicate the physical servers to Azure, at the block level, including any on-going changes. This occurs in the background, without disrupting the running application.</a:t>
-            </a:r>
-          </a:p>
-          <a:p>
-            <a:pPr marL="228600" indent="-228600">
-              <a:buFont typeface="+mj-lt"/>
-              <a:buAutoNum type="arabicPeriod"/>
-            </a:pPr>
+              <a:t>and connecting it with your Recovery Service Vault.</a:t>
+            </a:r>
+          </a:p>
+          <a:p>
             <a:r>
               <a:rPr lang="en-US" sz="1200" b="0" kern="1200" dirty="0">
                 <a:solidFill>
@@ -4032,14 +4030,10 @@
                 <a:ea typeface="+mn-ea"/>
                 <a:cs typeface="+mn-cs"/>
               </a:rPr>
-              <a:t>To test the migrated server, CloudEndure allows you to spin up new Azure servers for verification</a:t>
-            </a:r>
-          </a:p>
-          <a:p>
-            <a:pPr marL="228600" indent="-228600">
-              <a:buFont typeface="+mj-lt"/>
-              <a:buAutoNum type="arabicPeriod"/>
-            </a:pPr>
+              <a:t>- Replicating the web tier servers to Azure Storage. This includes setting the replication policy</a:t>
+            </a:r>
+          </a:p>
+          <a:p>
             <a:r>
               <a:rPr lang="en-US" sz="1200" b="0" kern="1200" dirty="0">
                 <a:solidFill>
@@ -4050,7 +4044,432 @@
                 <a:ea typeface="+mn-ea"/>
                 <a:cs typeface="+mn-cs"/>
               </a:rPr>
-              <a:t>Once testing is complete, user traffic can be cut over to the migrated servers similarly to the procurement system.</a:t>
+              <a:t>which defines the retention period (0 suffices since we will only use the latest recovery point),</a:t>
+            </a:r>
+          </a:p>
+          <a:p>
+            <a:r>
+              <a:rPr lang="en-US" sz="1200" b="0" kern="1200" dirty="0">
+                <a:solidFill>
+                  <a:schemeClr val="tx1"/>
+                </a:solidFill>
+                <a:effectLst/>
+                <a:latin typeface="+mn-lt"/>
+                <a:ea typeface="+mn-ea"/>
+                <a:cs typeface="+mn-cs"/>
+              </a:rPr>
+              <a:t>the type of snapshots to use (crash-consistent snapshots suffices for the web tier), and whether</a:t>
+            </a:r>
+          </a:p>
+          <a:p>
+            <a:r>
+              <a:rPr lang="en-US" sz="1200" b="0" kern="1200" dirty="0">
+                <a:solidFill>
+                  <a:schemeClr val="tx1"/>
+                </a:solidFill>
+                <a:effectLst/>
+                <a:latin typeface="+mn-lt"/>
+                <a:ea typeface="+mn-ea"/>
+                <a:cs typeface="+mn-cs"/>
+              </a:rPr>
+              <a:t>to use a replication group.</a:t>
+            </a:r>
+          </a:p>
+          <a:p>
+            <a:br>
+              <a:rPr lang="en-US" sz="1200" b="0" kern="1200" dirty="0">
+                <a:solidFill>
+                  <a:schemeClr val="tx1"/>
+                </a:solidFill>
+                <a:effectLst/>
+                <a:latin typeface="+mn-lt"/>
+                <a:ea typeface="+mn-ea"/>
+                <a:cs typeface="+mn-cs"/>
+              </a:rPr>
+            </a:br>
+            <a:r>
+              <a:rPr lang="en-US" sz="1200" b="0" kern="1200" dirty="0">
+                <a:solidFill>
+                  <a:schemeClr val="tx1"/>
+                </a:solidFill>
+                <a:effectLst/>
+                <a:latin typeface="+mn-lt"/>
+                <a:ea typeface="+mn-ea"/>
+                <a:cs typeface="+mn-cs"/>
+              </a:rPr>
+              <a:t>To test the migration before the live site cutover:</a:t>
+            </a:r>
+          </a:p>
+          <a:p>
+            <a:r>
+              <a:rPr lang="en-US" sz="1200" b="0" kern="1200" dirty="0">
+                <a:solidFill>
+                  <a:schemeClr val="tx1"/>
+                </a:solidFill>
+                <a:effectLst/>
+                <a:latin typeface="+mn-lt"/>
+                <a:ea typeface="+mn-ea"/>
+                <a:cs typeface="+mn-cs"/>
+              </a:rPr>
+              <a:t>- Initiate a test failover from the Azure portal. This will create</a:t>
+            </a:r>
+          </a:p>
+          <a:p>
+            <a:r>
+              <a:rPr lang="en-US" sz="1200" b="0" kern="1200" dirty="0">
+                <a:solidFill>
+                  <a:schemeClr val="tx1"/>
+                </a:solidFill>
+                <a:effectLst/>
+                <a:latin typeface="+mn-lt"/>
+                <a:ea typeface="+mn-ea"/>
+                <a:cs typeface="+mn-cs"/>
+              </a:rPr>
+              <a:t>new Azure VMs from the replicated data from the legacy web servers.</a:t>
+            </a:r>
+          </a:p>
+          <a:p>
+            <a:r>
+              <a:rPr lang="en-US" sz="1200" b="0" kern="1200" dirty="0">
+                <a:solidFill>
+                  <a:schemeClr val="tx1"/>
+                </a:solidFill>
+                <a:effectLst/>
+                <a:latin typeface="+mn-lt"/>
+                <a:ea typeface="+mn-ea"/>
+                <a:cs typeface="+mn-cs"/>
+              </a:rPr>
+              <a:t>These VMs will be connected to the on-premises production database</a:t>
+            </a:r>
+          </a:p>
+          <a:p>
+            <a:r>
+              <a:rPr lang="en-US" sz="1200" b="0" kern="1200" dirty="0">
+                <a:solidFill>
+                  <a:schemeClr val="tx1"/>
+                </a:solidFill>
+                <a:effectLst/>
+                <a:latin typeface="+mn-lt"/>
+                <a:ea typeface="+mn-ea"/>
+                <a:cs typeface="+mn-cs"/>
+              </a:rPr>
+              <a:t>(if desired, a test database could be configured).</a:t>
+            </a:r>
+          </a:p>
+          <a:p>
+            <a:r>
+              <a:rPr lang="en-US" sz="1200" b="0" kern="1200" dirty="0">
+                <a:solidFill>
+                  <a:schemeClr val="tx1"/>
+                </a:solidFill>
+                <a:effectLst/>
+                <a:latin typeface="+mn-lt"/>
+                <a:ea typeface="+mn-ea"/>
+                <a:cs typeface="+mn-cs"/>
+              </a:rPr>
+              <a:t>- Configure the backend server pool of the Internal Load Balancer</a:t>
+            </a:r>
+          </a:p>
+          <a:p>
+            <a:r>
+              <a:rPr lang="en-US" sz="1200" b="0" kern="1200" dirty="0">
+                <a:solidFill>
+                  <a:schemeClr val="tx1"/>
+                </a:solidFill>
+                <a:effectLst/>
+                <a:latin typeface="+mn-lt"/>
+                <a:ea typeface="+mn-ea"/>
+                <a:cs typeface="+mn-cs"/>
+              </a:rPr>
+              <a:t>to reference the HR web servers.</a:t>
+            </a:r>
+          </a:p>
+          <a:p>
+            <a:r>
+              <a:rPr lang="en-US" sz="1200" b="0" kern="1200" dirty="0">
+                <a:solidFill>
+                  <a:schemeClr val="tx1"/>
+                </a:solidFill>
+                <a:effectLst/>
+                <a:latin typeface="+mn-lt"/>
+                <a:ea typeface="+mn-ea"/>
+                <a:cs typeface="+mn-cs"/>
+              </a:rPr>
+              <a:t>- Test the new web tier via the Internal Load Balancer front-end IP. </a:t>
+            </a:r>
+          </a:p>
+          <a:p>
+            <a:br>
+              <a:rPr lang="en-US" sz="1200" b="0" kern="1200" dirty="0">
+                <a:solidFill>
+                  <a:schemeClr val="tx1"/>
+                </a:solidFill>
+                <a:effectLst/>
+                <a:latin typeface="+mn-lt"/>
+                <a:ea typeface="+mn-ea"/>
+                <a:cs typeface="+mn-cs"/>
+              </a:rPr>
+            </a:br>
+            <a:r>
+              <a:rPr lang="en-US" sz="1200" b="0" kern="1200" dirty="0">
+                <a:solidFill>
+                  <a:schemeClr val="tx1"/>
+                </a:solidFill>
+                <a:effectLst/>
+                <a:latin typeface="+mn-lt"/>
+                <a:ea typeface="+mn-ea"/>
+                <a:cs typeface="+mn-cs"/>
+              </a:rPr>
+              <a:t>To perform the migration:</a:t>
+            </a:r>
+          </a:p>
+          <a:p>
+            <a:r>
+              <a:rPr lang="en-US" sz="1200" b="0" kern="1200" dirty="0">
+                <a:solidFill>
+                  <a:schemeClr val="tx1"/>
+                </a:solidFill>
+                <a:effectLst/>
+                <a:latin typeface="+mn-lt"/>
+                <a:ea typeface="+mn-ea"/>
+                <a:cs typeface="+mn-cs"/>
+              </a:rPr>
+              <a:t>- Initiate a planned failover from the Azure portal. As with the test</a:t>
+            </a:r>
+          </a:p>
+          <a:p>
+            <a:r>
+              <a:rPr lang="en-US" sz="1200" b="0" kern="1200" dirty="0">
+                <a:solidFill>
+                  <a:schemeClr val="tx1"/>
+                </a:solidFill>
+                <a:effectLst/>
+                <a:latin typeface="+mn-lt"/>
+                <a:ea typeface="+mn-ea"/>
+                <a:cs typeface="+mn-cs"/>
+              </a:rPr>
+              <a:t>failover, this will create Azure VMs from the replicated web tier disks,</a:t>
+            </a:r>
+          </a:p>
+          <a:p>
+            <a:r>
+              <a:rPr lang="en-US" sz="1200" b="0" kern="1200" dirty="0">
+                <a:solidFill>
+                  <a:schemeClr val="tx1"/>
+                </a:solidFill>
+                <a:effectLst/>
+                <a:latin typeface="+mn-lt"/>
+                <a:ea typeface="+mn-ea"/>
+                <a:cs typeface="+mn-cs"/>
+              </a:rPr>
+              <a:t>connected to the on-premises production database.</a:t>
+            </a:r>
+          </a:p>
+          <a:p>
+            <a:r>
+              <a:rPr lang="en-US" sz="1200" b="0" kern="1200" dirty="0">
+                <a:solidFill>
+                  <a:schemeClr val="tx1"/>
+                </a:solidFill>
+                <a:effectLst/>
+                <a:latin typeface="+mn-lt"/>
+                <a:ea typeface="+mn-ea"/>
+                <a:cs typeface="+mn-cs"/>
+              </a:rPr>
+              <a:t>- Update the Internal Load Balancer back-end server pool to reference</a:t>
+            </a:r>
+          </a:p>
+          <a:p>
+            <a:r>
+              <a:rPr lang="en-US" sz="1200" b="0" kern="1200" dirty="0">
+                <a:solidFill>
+                  <a:schemeClr val="tx1"/>
+                </a:solidFill>
+                <a:effectLst/>
+                <a:latin typeface="+mn-lt"/>
+                <a:ea typeface="+mn-ea"/>
+                <a:cs typeface="+mn-cs"/>
+              </a:rPr>
+              <a:t>the new web server VMs, and validate the application is working.</a:t>
+            </a:r>
+          </a:p>
+          <a:p>
+            <a:r>
+              <a:rPr lang="en-US" sz="1200" b="0" kern="1200" dirty="0">
+                <a:solidFill>
+                  <a:schemeClr val="tx1"/>
+                </a:solidFill>
+                <a:effectLst/>
+                <a:latin typeface="+mn-lt"/>
+                <a:ea typeface="+mn-ea"/>
+                <a:cs typeface="+mn-cs"/>
+              </a:rPr>
+              <a:t>- Update the DNS entry for the 'https://&lt;span&gt;&lt;/span&gt;AskHR' endpoint</a:t>
+            </a:r>
+          </a:p>
+          <a:p>
+            <a:r>
+              <a:rPr lang="en-US" sz="1200" b="0" kern="1200" dirty="0">
+                <a:solidFill>
+                  <a:schemeClr val="tx1"/>
+                </a:solidFill>
+                <a:effectLst/>
+                <a:latin typeface="+mn-lt"/>
+                <a:ea typeface="+mn-ea"/>
+                <a:cs typeface="+mn-cs"/>
+              </a:rPr>
+              <a:t>to point to the Internal Load Balancer front-end.</a:t>
+            </a:r>
+          </a:p>
+          <a:p>
+            <a:br>
+              <a:rPr lang="en-US" sz="1200" b="0" kern="1200" dirty="0">
+                <a:solidFill>
+                  <a:schemeClr val="tx1"/>
+                </a:solidFill>
+                <a:effectLst/>
+                <a:latin typeface="+mn-lt"/>
+                <a:ea typeface="+mn-ea"/>
+                <a:cs typeface="+mn-cs"/>
+              </a:rPr>
+            </a:br>
+            <a:r>
+              <a:rPr lang="en-US" sz="1200" b="0" kern="1200" dirty="0">
+                <a:solidFill>
+                  <a:schemeClr val="tx1"/>
+                </a:solidFill>
+                <a:effectLst/>
+                <a:latin typeface="+mn-lt"/>
+                <a:ea typeface="+mn-ea"/>
+                <a:cs typeface="+mn-cs"/>
+              </a:rPr>
+              <a:t>Rollback (if required):</a:t>
+            </a:r>
+          </a:p>
+          <a:p>
+            <a:r>
+              <a:rPr lang="en-US" sz="1200" b="0" kern="1200" dirty="0">
+                <a:solidFill>
+                  <a:schemeClr val="tx1"/>
+                </a:solidFill>
+                <a:effectLst/>
+                <a:latin typeface="+mn-lt"/>
+                <a:ea typeface="+mn-ea"/>
+                <a:cs typeface="+mn-cs"/>
+              </a:rPr>
+              <a:t>- If the migration does not work properly, there is a simple back out plan. The</a:t>
+            </a:r>
+          </a:p>
+          <a:p>
+            <a:r>
+              <a:rPr lang="en-US" sz="1200" b="0" kern="1200" dirty="0">
+                <a:solidFill>
+                  <a:schemeClr val="tx1"/>
+                </a:solidFill>
+                <a:effectLst/>
+                <a:latin typeface="+mn-lt"/>
+                <a:ea typeface="+mn-ea"/>
+                <a:cs typeface="+mn-cs"/>
+              </a:rPr>
+              <a:t>planned failover should be canceled from the portal and</a:t>
+            </a:r>
+          </a:p>
+          <a:p>
+            <a:r>
+              <a:rPr lang="en-US" sz="1200" b="0" kern="1200" dirty="0">
+                <a:solidFill>
+                  <a:schemeClr val="tx1"/>
+                </a:solidFill>
+                <a:effectLst/>
+                <a:latin typeface="+mn-lt"/>
+                <a:ea typeface="+mn-ea"/>
+                <a:cs typeface="+mn-cs"/>
+              </a:rPr>
+              <a:t>then the physical servers on-premises should be restarted to restore</a:t>
+            </a:r>
+          </a:p>
+          <a:p>
+            <a:r>
+              <a:rPr lang="en-US" sz="1200" b="0" kern="1200" dirty="0">
+                <a:solidFill>
+                  <a:schemeClr val="tx1"/>
+                </a:solidFill>
+                <a:effectLst/>
+                <a:latin typeface="+mn-lt"/>
+                <a:ea typeface="+mn-ea"/>
+                <a:cs typeface="+mn-cs"/>
+              </a:rPr>
+              <a:t>service.</a:t>
+            </a:r>
+          </a:p>
+          <a:p>
+            <a:r>
+              <a:rPr lang="en-US" sz="1200" b="0" kern="1200" dirty="0">
+                <a:solidFill>
+                  <a:schemeClr val="tx1"/>
+                </a:solidFill>
+                <a:effectLst/>
+                <a:latin typeface="+mn-lt"/>
+                <a:ea typeface="+mn-ea"/>
+                <a:cs typeface="+mn-cs"/>
+              </a:rPr>
+              <a:t>- If the 'AskHR' DNS entry has already been updated, revert it to the previous value.</a:t>
+            </a:r>
+          </a:p>
+          <a:p>
+            <a:r>
+              <a:rPr lang="en-US" sz="1200" b="0" kern="1200" dirty="0">
+                <a:solidFill>
+                  <a:schemeClr val="tx1"/>
+                </a:solidFill>
+                <a:effectLst/>
+                <a:latin typeface="+mn-lt"/>
+                <a:ea typeface="+mn-ea"/>
+                <a:cs typeface="+mn-cs"/>
+              </a:rPr>
+              <a:t>&gt; **Note**: To minimize the impact of DNS caching, the Time-To-Live (TTL) for the DNS entry</a:t>
+            </a:r>
+          </a:p>
+          <a:p>
+            <a:r>
+              <a:rPr lang="en-US" sz="1200" b="0" kern="1200" dirty="0">
+                <a:solidFill>
+                  <a:schemeClr val="tx1"/>
+                </a:solidFill>
+                <a:effectLst/>
+                <a:latin typeface="+mn-lt"/>
+                <a:ea typeface="+mn-ea"/>
+                <a:cs typeface="+mn-cs"/>
+              </a:rPr>
+              <a:t>should be reduced to a short value (e.g. 60 seconds) well in advance of the migration.</a:t>
+            </a:r>
+          </a:p>
+          <a:p>
+            <a:r>
+              <a:rPr lang="en-US" sz="1200" b="0" kern="1200" dirty="0">
+                <a:solidFill>
+                  <a:schemeClr val="tx1"/>
+                </a:solidFill>
+                <a:effectLst/>
+                <a:latin typeface="+mn-lt"/>
+                <a:ea typeface="+mn-ea"/>
+                <a:cs typeface="+mn-cs"/>
+              </a:rPr>
+              <a:t>This enables DNS changes during migration and roll-back to take effect quickly.</a:t>
+            </a:r>
+          </a:p>
+          <a:p>
+            <a:r>
+              <a:rPr lang="en-US" sz="1200" b="0" kern="1200" dirty="0">
+                <a:solidFill>
+                  <a:schemeClr val="tx1"/>
+                </a:solidFill>
+                <a:effectLst/>
+                <a:latin typeface="+mn-lt"/>
+                <a:ea typeface="+mn-ea"/>
+                <a:cs typeface="+mn-cs"/>
+              </a:rPr>
+              <a:t>Once migration is successful and stable, the TTL should be returned to a long value (e.g. 1 day)</a:t>
             </a:r>
           </a:p>
           <a:p>
@@ -5797,7 +6216,7 @@
                   <a:prstClr val="black"/>
                 </a:solidFill>
               </a:rPr>
-              <a:t>12/19/2018 11:43 AM</a:t>
+              <a:t>1/21/2019 1:59 PM</a:t>
             </a:fld>
             <a:endParaRPr lang="en-US" dirty="0">
               <a:solidFill>
@@ -20261,7 +20680,7 @@
         <p:spPr>
           <a:xfrm>
             <a:off x="269240" y="1373762"/>
-            <a:ext cx="5378548" cy="4380173"/>
+            <a:ext cx="7234424" cy="5795946"/>
           </a:xfrm>
         </p:spPr>
         <p:txBody>
@@ -20269,40 +20688,89 @@
           <a:lstStyle/>
           <a:p>
             <a:r>
+              <a:rPr lang="en-US" sz="2800" dirty="0">
+                <a:latin typeface="+mn-lt"/>
+              </a:rPr>
+              <a:t>Use Azure Site Recovery to migrate physical servers to Azure VMs.</a:t>
+            </a:r>
+          </a:p>
+          <a:p>
+            <a:pPr lvl="1">
+              <a:spcBef>
+                <a:spcPts val="1200"/>
+              </a:spcBef>
+            </a:pPr>
+            <a:r>
               <a:rPr lang="en-US" sz="2400" dirty="0">
                 <a:latin typeface="+mn-lt"/>
               </a:rPr>
-              <a:t>Cannot use Azure Site Recovery due to physical servers with UEFI boot.</a:t>
-            </a:r>
-          </a:p>
-          <a:p>
+              <a:t>Configure Azure environment including Recovery Services Vault, Virtual Network and Storage Account</a:t>
+            </a:r>
+          </a:p>
+          <a:p>
+            <a:pPr lvl="1">
+              <a:spcBef>
+                <a:spcPts val="1200"/>
+              </a:spcBef>
+            </a:pPr>
             <a:r>
               <a:rPr lang="en-US" sz="2400" dirty="0">
                 <a:latin typeface="+mn-lt"/>
               </a:rPr>
-              <a:t>Cannot re-install since installers not available.</a:t>
-            </a:r>
-          </a:p>
-          <a:p>
+              <a:t>Setup ASR on-premises including ASR Configuration Server</a:t>
+            </a:r>
+          </a:p>
+          <a:p>
+            <a:pPr lvl="1">
+              <a:spcBef>
+                <a:spcPts val="1200"/>
+              </a:spcBef>
+            </a:pPr>
             <a:r>
               <a:rPr lang="en-US" sz="2400" dirty="0">
                 <a:latin typeface="+mn-lt"/>
               </a:rPr>
-              <a:t>Consider third-party migration tools</a:t>
-            </a:r>
-          </a:p>
-          <a:p>
+              <a:t>Replicate web-tier servers to Azure Storage</a:t>
+            </a:r>
+          </a:p>
+          <a:p>
+            <a:pPr lvl="1">
+              <a:spcBef>
+                <a:spcPts val="1200"/>
+              </a:spcBef>
+            </a:pPr>
             <a:r>
               <a:rPr lang="en-US" sz="2400" dirty="0">
                 <a:latin typeface="+mn-lt"/>
               </a:rPr>
-              <a:t>See list at: https://azure.microsoft.com/migration/migrate/</a:t>
-            </a:r>
-          </a:p>
-          <a:p>
-            <a:endParaRPr lang="en-US" sz="2400" dirty="0">
-              <a:latin typeface="+mn-lt"/>
-            </a:endParaRPr>
+              <a:t>Test and Initiate planned failover to Azure VMs </a:t>
+            </a:r>
+          </a:p>
+          <a:p>
+            <a:pPr lvl="1">
+              <a:spcBef>
+                <a:spcPts val="1200"/>
+              </a:spcBef>
+            </a:pPr>
+            <a:r>
+              <a:rPr lang="en-US" sz="2400" dirty="0">
+                <a:latin typeface="+mn-lt"/>
+              </a:rPr>
+              <a:t>Reconfigure Internal Load Balancer backend pool to point to web server VMs in Azure</a:t>
+            </a:r>
+          </a:p>
+          <a:p>
+            <a:pPr lvl="1">
+              <a:spcBef>
+                <a:spcPts val="1200"/>
+              </a:spcBef>
+            </a:pPr>
+            <a:r>
+              <a:rPr lang="en-US" sz="2400" dirty="0">
+                <a:latin typeface="+mn-lt"/>
+              </a:rPr>
+              <a:t>Update DNS entry for 'http://AskHR'</a:t>
+            </a:r>
           </a:p>
           <a:p>
             <a:endParaRPr lang="en-US" dirty="0"/>
@@ -20311,10 +20779,10 @@
       </p:sp>
       <p:pic>
         <p:nvPicPr>
-          <p:cNvPr id="6" name="Picture 5" descr="This image shows the company names and logos for a variety of Microsoft partners who offer third-party Azure migration tools. The partners listed are Attunity, CloudEndure, Corent, Datometry, and Informatica." title="Third-party migration partners">
+          <p:cNvPr id="4" name="Picture 3">
             <a:extLst>
               <a:ext uri="{FF2B5EF4-FFF2-40B4-BE49-F238E27FC236}">
-                <a16:creationId xmlns:a16="http://schemas.microsoft.com/office/drawing/2014/main" id="{A8C9AD3C-F457-4185-8F65-F300B9D5C0DF}"/>
+                <a16:creationId xmlns:a16="http://schemas.microsoft.com/office/drawing/2014/main" id="{E73BAE6C-DCC8-4B28-90B5-E028448C784A}"/>
               </a:ext>
             </a:extLst>
           </p:cNvPr>
@@ -20324,21 +20792,15 @@
           <p:nvPr/>
         </p:nvPicPr>
         <p:blipFill>
-          <a:blip r:embed="rId3">
-            <a:extLst>
-              <a:ext uri="{28A0092B-C50C-407E-A947-70E740481C1C}">
-                <a14:useLocalDpi xmlns:a14="http://schemas.microsoft.com/office/drawing/2010/main" val="0"/>
-              </a:ext>
-            </a:extLst>
-          </a:blip>
+          <a:blip r:embed="rId3"/>
           <a:stretch>
             <a:fillRect/>
           </a:stretch>
         </p:blipFill>
         <p:spPr>
           <a:xfrm>
-            <a:off x="6096000" y="1373762"/>
-            <a:ext cx="5598996" cy="4883081"/>
+            <a:off x="7671944" y="2744469"/>
+            <a:ext cx="4023709" cy="1871634"/>
           </a:xfrm>
           <a:prstGeom prst="rect">
             <a:avLst/>

</xml_diff>